<commit_message>
Doc slide deck improvements
</commit_message>
<xml_diff>
--- a/documentation/Solution Architecture.pptx
+++ b/documentation/Solution Architecture.pptx
@@ -197,7 +197,7 @@
           <a:p>
             <a:fld id="{C5B3612C-3DB7-8F4D-81AE-AA1927E1DBCF}" type="datetimeFigureOut">
               <a:rPr lang="en-US" smtClean="0"/>
-              <a:t>3/20/24</a:t>
+              <a:t>4/5/24</a:t>
             </a:fld>
             <a:endParaRPr lang="en-US"/>
           </a:p>
@@ -695,7 +695,7 @@
           <a:p>
             <a:fld id="{79BD70DF-5F30-1843-9E5E-E7485BBBB0A2}" type="datetimeFigureOut">
               <a:rPr lang="en-US" smtClean="0"/>
-              <a:t>3/20/24</a:t>
+              <a:t>4/5/24</a:t>
             </a:fld>
             <a:endParaRPr lang="en-US"/>
           </a:p>
@@ -893,7 +893,7 @@
           <a:p>
             <a:fld id="{79BD70DF-5F30-1843-9E5E-E7485BBBB0A2}" type="datetimeFigureOut">
               <a:rPr lang="en-US" smtClean="0"/>
-              <a:t>3/20/24</a:t>
+              <a:t>4/5/24</a:t>
             </a:fld>
             <a:endParaRPr lang="en-US"/>
           </a:p>
@@ -1101,7 +1101,7 @@
           <a:p>
             <a:fld id="{79BD70DF-5F30-1843-9E5E-E7485BBBB0A2}" type="datetimeFigureOut">
               <a:rPr lang="en-US" smtClean="0"/>
-              <a:t>3/20/24</a:t>
+              <a:t>4/5/24</a:t>
             </a:fld>
             <a:endParaRPr lang="en-US"/>
           </a:p>
@@ -1299,7 +1299,7 @@
           <a:p>
             <a:fld id="{79BD70DF-5F30-1843-9E5E-E7485BBBB0A2}" type="datetimeFigureOut">
               <a:rPr lang="en-US" smtClean="0"/>
-              <a:t>3/20/24</a:t>
+              <a:t>4/5/24</a:t>
             </a:fld>
             <a:endParaRPr lang="en-US"/>
           </a:p>
@@ -1574,7 +1574,7 @@
           <a:p>
             <a:fld id="{79BD70DF-5F30-1843-9E5E-E7485BBBB0A2}" type="datetimeFigureOut">
               <a:rPr lang="en-US" smtClean="0"/>
-              <a:t>3/20/24</a:t>
+              <a:t>4/5/24</a:t>
             </a:fld>
             <a:endParaRPr lang="en-US"/>
           </a:p>
@@ -1839,7 +1839,7 @@
           <a:p>
             <a:fld id="{79BD70DF-5F30-1843-9E5E-E7485BBBB0A2}" type="datetimeFigureOut">
               <a:rPr lang="en-US" smtClean="0"/>
-              <a:t>3/20/24</a:t>
+              <a:t>4/5/24</a:t>
             </a:fld>
             <a:endParaRPr lang="en-US"/>
           </a:p>
@@ -2251,7 +2251,7 @@
           <a:p>
             <a:fld id="{79BD70DF-5F30-1843-9E5E-E7485BBBB0A2}" type="datetimeFigureOut">
               <a:rPr lang="en-US" smtClean="0"/>
-              <a:t>3/20/24</a:t>
+              <a:t>4/5/24</a:t>
             </a:fld>
             <a:endParaRPr lang="en-US"/>
           </a:p>
@@ -2392,7 +2392,7 @@
           <a:p>
             <a:fld id="{79BD70DF-5F30-1843-9E5E-E7485BBBB0A2}" type="datetimeFigureOut">
               <a:rPr lang="en-US" smtClean="0"/>
-              <a:t>3/20/24</a:t>
+              <a:t>4/5/24</a:t>
             </a:fld>
             <a:endParaRPr lang="en-US"/>
           </a:p>
@@ -2505,7 +2505,7 @@
           <a:p>
             <a:fld id="{79BD70DF-5F30-1843-9E5E-E7485BBBB0A2}" type="datetimeFigureOut">
               <a:rPr lang="en-US" smtClean="0"/>
-              <a:t>3/20/24</a:t>
+              <a:t>4/5/24</a:t>
             </a:fld>
             <a:endParaRPr lang="en-US"/>
           </a:p>
@@ -2816,7 +2816,7 @@
           <a:p>
             <a:fld id="{79BD70DF-5F30-1843-9E5E-E7485BBBB0A2}" type="datetimeFigureOut">
               <a:rPr lang="en-US" smtClean="0"/>
-              <a:t>3/20/24</a:t>
+              <a:t>4/5/24</a:t>
             </a:fld>
             <a:endParaRPr lang="en-US"/>
           </a:p>
@@ -3104,7 +3104,7 @@
           <a:p>
             <a:fld id="{79BD70DF-5F30-1843-9E5E-E7485BBBB0A2}" type="datetimeFigureOut">
               <a:rPr lang="en-US" smtClean="0"/>
-              <a:t>3/20/24</a:t>
+              <a:t>4/5/24</a:t>
             </a:fld>
             <a:endParaRPr lang="en-US"/>
           </a:p>
@@ -3345,7 +3345,7 @@
           <a:p>
             <a:fld id="{79BD70DF-5F30-1843-9E5E-E7485BBBB0A2}" type="datetimeFigureOut">
               <a:rPr lang="en-US" smtClean="0"/>
-              <a:t>3/20/24</a:t>
+              <a:t>4/5/24</a:t>
             </a:fld>
             <a:endParaRPr lang="en-US"/>
           </a:p>
@@ -3762,66 +3762,12 @@
           <a:chExt cx="0" cy="0"/>
         </a:xfrm>
       </p:grpSpPr>
-      <p:sp>
-        <p:nvSpPr>
-          <p:cNvPr id="24" name="Rectangle 23">
-            <a:extLst>
-              <a:ext uri="{FF2B5EF4-FFF2-40B4-BE49-F238E27FC236}">
-                <a16:creationId xmlns:a16="http://schemas.microsoft.com/office/drawing/2014/main" id="{B95F145D-B71C-4FD7-723F-0E353DF9CC3B}"/>
-              </a:ext>
-            </a:extLst>
-          </p:cNvPr>
-          <p:cNvSpPr/>
-          <p:nvPr/>
-        </p:nvSpPr>
-        <p:spPr>
-          <a:xfrm>
-            <a:off x="7425989" y="2616480"/>
-            <a:ext cx="2036514" cy="893963"/>
-          </a:xfrm>
-          <a:prstGeom prst="rect">
-            <a:avLst/>
-          </a:prstGeom>
-          <a:solidFill>
-            <a:schemeClr val="bg1"/>
-          </a:solidFill>
-          <a:ln>
-            <a:solidFill>
-              <a:srgbClr val="002060"/>
-            </a:solidFill>
-          </a:ln>
-        </p:spPr>
-        <p:style>
-          <a:lnRef idx="2">
-            <a:schemeClr val="accent1">
-              <a:shade val="15000"/>
-            </a:schemeClr>
-          </a:lnRef>
-          <a:fillRef idx="1">
-            <a:schemeClr val="accent1"/>
-          </a:fillRef>
-          <a:effectRef idx="0">
-            <a:schemeClr val="accent1"/>
-          </a:effectRef>
-          <a:fontRef idx="minor">
-            <a:schemeClr val="lt1"/>
-          </a:fontRef>
-        </p:style>
-        <p:txBody>
-          <a:bodyPr rtlCol="0" anchor="ctr"/>
-          <a:lstStyle/>
-          <a:p>
-            <a:pPr algn="ctr"/>
-            <a:endParaRPr lang="en-US"/>
-          </a:p>
-        </p:txBody>
-      </p:sp>
       <p:pic>
         <p:nvPicPr>
-          <p:cNvPr id="1026" name="Picture 2" descr="Static Web Apps pricing - Microsoft Azure">
-            <a:extLst>
-              <a:ext uri="{FF2B5EF4-FFF2-40B4-BE49-F238E27FC236}">
-                <a16:creationId xmlns:a16="http://schemas.microsoft.com/office/drawing/2014/main" id="{DA669C3A-B41E-CF16-42E5-B55E3F605122}"/>
+          <p:cNvPr id="1028" name="Picture 4">
+            <a:extLst>
+              <a:ext uri="{FF2B5EF4-FFF2-40B4-BE49-F238E27FC236}">
+                <a16:creationId xmlns:a16="http://schemas.microsoft.com/office/drawing/2014/main" id="{A4D07CF9-246B-6B5B-E6E4-5C25E6BD1602}"/>
               </a:ext>
             </a:extLst>
           </p:cNvPr>
@@ -3830,7 +3776,7 @@
           </p:cNvPicPr>
           <p:nvPr/>
         </p:nvPicPr>
-        <p:blipFill rotWithShape="1">
+        <p:blipFill>
           <a:blip r:embed="rId3">
             <a:extLst>
               <a:ext uri="{28A0092B-C50C-407E-A947-70E740481C1C}">
@@ -3838,13 +3784,15 @@
               </a:ext>
             </a:extLst>
           </a:blip>
-          <a:srcRect l="13727" t="-6546" r="14352" b="-7437"/>
-          <a:stretch/>
+          <a:srcRect/>
+          <a:stretch>
+            <a:fillRect/>
+          </a:stretch>
         </p:blipFill>
         <p:spPr bwMode="auto">
           <a:xfrm>
-            <a:off x="1905817" y="2348374"/>
-            <a:ext cx="1611087" cy="1340483"/>
+            <a:off x="100688" y="2063300"/>
+            <a:ext cx="1105930" cy="961678"/>
           </a:xfrm>
           <a:prstGeom prst="rect">
             <a:avLst/>
@@ -3863,10 +3811,10 @@
       </p:pic>
       <p:pic>
         <p:nvPicPr>
-          <p:cNvPr id="1028" name="Picture 4">
-            <a:extLst>
-              <a:ext uri="{FF2B5EF4-FFF2-40B4-BE49-F238E27FC236}">
-                <a16:creationId xmlns:a16="http://schemas.microsoft.com/office/drawing/2014/main" id="{A4D07CF9-246B-6B5B-E6E4-5C25E6BD1602}"/>
+          <p:cNvPr id="1032" name="Picture 8" descr="Free OpenAI Logo Icon - Download in Flat Style">
+            <a:extLst>
+              <a:ext uri="{FF2B5EF4-FFF2-40B4-BE49-F238E27FC236}">
+                <a16:creationId xmlns:a16="http://schemas.microsoft.com/office/drawing/2014/main" id="{D93BEB40-384C-93B1-DE04-7721260C5C65}"/>
               </a:ext>
             </a:extLst>
           </p:cNvPr>
@@ -3875,7 +3823,7 @@
           </p:cNvPicPr>
           <p:nvPr/>
         </p:nvPicPr>
-        <p:blipFill>
+        <p:blipFill rotWithShape="1">
           <a:blip r:embed="rId4">
             <a:extLst>
               <a:ext uri="{28A0092B-C50C-407E-A947-70E740481C1C}">
@@ -3883,15 +3831,13 @@
               </a:ext>
             </a:extLst>
           </a:blip>
-          <a:srcRect/>
-          <a:stretch>
-            <a:fillRect/>
-          </a:stretch>
+          <a:srcRect l="-1487" t="33690" r="1487" b="36898"/>
+          <a:stretch/>
         </p:blipFill>
         <p:spPr bwMode="auto">
           <a:xfrm>
-            <a:off x="202780" y="2507996"/>
-            <a:ext cx="1105930" cy="961678"/>
+            <a:off x="9869471" y="1578280"/>
+            <a:ext cx="2079453" cy="597484"/>
           </a:xfrm>
           <a:prstGeom prst="rect">
             <a:avLst/>
@@ -3908,159 +3854,26 @@
           </a:extLst>
         </p:spPr>
       </p:pic>
-      <p:pic>
-        <p:nvPicPr>
-          <p:cNvPr id="1030" name="Picture 6" descr="Releases · Azure/API-Management">
-            <a:extLst>
-              <a:ext uri="{FF2B5EF4-FFF2-40B4-BE49-F238E27FC236}">
-                <a16:creationId xmlns:a16="http://schemas.microsoft.com/office/drawing/2014/main" id="{740B1F91-6A47-BB0B-E517-73E0821E48D5}"/>
-              </a:ext>
-            </a:extLst>
-          </p:cNvPr>
-          <p:cNvPicPr>
-            <a:picLocks noChangeAspect="1" noChangeArrowheads="1"/>
-          </p:cNvPicPr>
-          <p:nvPr/>
-        </p:nvPicPr>
-        <p:blipFill rotWithShape="1">
-          <a:blip r:embed="rId5">
-            <a:extLst>
-              <a:ext uri="{28A0092B-C50C-407E-A947-70E740481C1C}">
-                <a14:useLocalDpi xmlns:a14="http://schemas.microsoft.com/office/drawing/2010/main" val="0"/>
-              </a:ext>
-            </a:extLst>
-          </a:blip>
-          <a:srcRect l="25684" t="2996" r="26028" b="4539"/>
-          <a:stretch/>
-        </p:blipFill>
-        <p:spPr bwMode="auto">
-          <a:xfrm>
-            <a:off x="4722074" y="2400117"/>
-            <a:ext cx="1308709" cy="1253020"/>
-          </a:xfrm>
-          <a:prstGeom prst="rect">
-            <a:avLst/>
-          </a:prstGeom>
-          <a:noFill/>
-          <a:extLst>
-            <a:ext uri="{909E8E84-426E-40DD-AFC4-6F175D3DCCD1}">
-              <a14:hiddenFill xmlns:a14="http://schemas.microsoft.com/office/drawing/2010/main">
-                <a:solidFill>
-                  <a:srgbClr val="FFFFFF"/>
-                </a:solidFill>
-              </a14:hiddenFill>
-            </a:ext>
-          </a:extLst>
-        </p:spPr>
-      </p:pic>
-      <p:pic>
-        <p:nvPicPr>
-          <p:cNvPr id="1032" name="Picture 8" descr="Free OpenAI Logo Icon - Download in Flat Style">
-            <a:extLst>
-              <a:ext uri="{FF2B5EF4-FFF2-40B4-BE49-F238E27FC236}">
-                <a16:creationId xmlns:a16="http://schemas.microsoft.com/office/drawing/2014/main" id="{D93BEB40-384C-93B1-DE04-7721260C5C65}"/>
-              </a:ext>
-            </a:extLst>
-          </p:cNvPr>
-          <p:cNvPicPr>
-            <a:picLocks noChangeAspect="1" noChangeArrowheads="1"/>
-          </p:cNvPicPr>
-          <p:nvPr/>
-        </p:nvPicPr>
-        <p:blipFill rotWithShape="1">
-          <a:blip r:embed="rId6">
-            <a:extLst>
-              <a:ext uri="{28A0092B-C50C-407E-A947-70E740481C1C}">
-                <a14:useLocalDpi xmlns:a14="http://schemas.microsoft.com/office/drawing/2010/main" val="0"/>
-              </a:ext>
-            </a:extLst>
-          </a:blip>
-          <a:srcRect l="-1487" t="33690" r="1487" b="36898"/>
-          <a:stretch/>
-        </p:blipFill>
-        <p:spPr bwMode="auto">
-          <a:xfrm>
-            <a:off x="10035574" y="1815091"/>
-            <a:ext cx="2079453" cy="597484"/>
-          </a:xfrm>
-          <a:prstGeom prst="rect">
-            <a:avLst/>
-          </a:prstGeom>
-          <a:noFill/>
-          <a:extLst>
-            <a:ext uri="{909E8E84-426E-40DD-AFC4-6F175D3DCCD1}">
-              <a14:hiddenFill xmlns:a14="http://schemas.microsoft.com/office/drawing/2010/main">
-                <a:solidFill>
-                  <a:srgbClr val="FFFFFF"/>
-                </a:solidFill>
-              </a14:hiddenFill>
-            </a:ext>
-          </a:extLst>
-        </p:spPr>
-      </p:pic>
       <p:cxnSp>
         <p:nvCxnSpPr>
-          <p:cNvPr id="5" name="Straight Arrow Connector 4">
-            <a:extLst>
-              <a:ext uri="{FF2B5EF4-FFF2-40B4-BE49-F238E27FC236}">
-                <a16:creationId xmlns:a16="http://schemas.microsoft.com/office/drawing/2014/main" id="{F3F2472A-2DDE-08CA-5311-87C5657F39BC}"/>
+          <p:cNvPr id="8" name="Straight Arrow Connector 7">
+            <a:extLst>
+              <a:ext uri="{FF2B5EF4-FFF2-40B4-BE49-F238E27FC236}">
+                <a16:creationId xmlns:a16="http://schemas.microsoft.com/office/drawing/2014/main" id="{1D74A08E-A105-7905-E253-98BA02AC9A35}"/>
               </a:ext>
             </a:extLst>
           </p:cNvPr>
           <p:cNvCxnSpPr>
             <a:cxnSpLocks/>
-            <a:stCxn id="1028" idx="3"/>
-            <a:endCxn id="1026" idx="1"/>
+            <a:stCxn id="54" idx="3"/>
+            <a:endCxn id="1032" idx="1"/>
           </p:cNvCxnSpPr>
           <p:nvPr/>
         </p:nvCxnSpPr>
         <p:spPr>
           <a:xfrm>
-            <a:off x="1308710" y="2988835"/>
-            <a:ext cx="597107" cy="29781"/>
-          </a:xfrm>
-          <a:prstGeom prst="straightConnector1">
-            <a:avLst/>
-          </a:prstGeom>
-          <a:ln>
-            <a:tailEnd type="triangle"/>
-          </a:ln>
-        </p:spPr>
-        <p:style>
-          <a:lnRef idx="2">
-            <a:schemeClr val="accent1"/>
-          </a:lnRef>
-          <a:fillRef idx="0">
-            <a:schemeClr val="accent1"/>
-          </a:fillRef>
-          <a:effectRef idx="1">
-            <a:schemeClr val="accent1"/>
-          </a:effectRef>
-          <a:fontRef idx="minor">
-            <a:schemeClr val="tx1"/>
-          </a:fontRef>
-        </p:style>
-      </p:cxnSp>
-      <p:cxnSp>
-        <p:nvCxnSpPr>
-          <p:cNvPr id="8" name="Straight Arrow Connector 7">
-            <a:extLst>
-              <a:ext uri="{FF2B5EF4-FFF2-40B4-BE49-F238E27FC236}">
-                <a16:creationId xmlns:a16="http://schemas.microsoft.com/office/drawing/2014/main" id="{1D74A08E-A105-7905-E253-98BA02AC9A35}"/>
-              </a:ext>
-            </a:extLst>
-          </p:cNvPr>
-          <p:cNvCxnSpPr>
-            <a:cxnSpLocks/>
-            <a:stCxn id="1026" idx="3"/>
-            <a:endCxn id="1030" idx="1"/>
-          </p:cNvCxnSpPr>
-          <p:nvPr/>
-        </p:nvCxnSpPr>
-        <p:spPr>
-          <a:xfrm>
-            <a:off x="3516904" y="3018616"/>
-            <a:ext cx="1205170" cy="8011"/>
+            <a:off x="4871421" y="1866151"/>
+            <a:ext cx="4998050" cy="10871"/>
           </a:xfrm>
           <a:prstGeom prst="straightConnector1">
             <a:avLst/>
@@ -4099,7 +3912,7 @@
           <p:nvPr/>
         </p:nvPicPr>
         <p:blipFill rotWithShape="1">
-          <a:blip r:embed="rId7">
+          <a:blip r:embed="rId5">
             <a:extLst>
               <a:ext uri="{28A0092B-C50C-407E-A947-70E740481C1C}">
                 <a14:useLocalDpi xmlns:a14="http://schemas.microsoft.com/office/drawing/2010/main" val="0"/>
@@ -4111,7 +3924,7 @@
         </p:blipFill>
         <p:spPr bwMode="auto">
           <a:xfrm>
-            <a:off x="4990686" y="857020"/>
+            <a:off x="2867643" y="209545"/>
             <a:ext cx="771484" cy="892627"/>
           </a:xfrm>
           <a:prstGeom prst="rect">
@@ -4129,51 +3942,6 @@
           </a:extLst>
         </p:spPr>
       </p:pic>
-      <p:pic>
-        <p:nvPicPr>
-          <p:cNvPr id="1036" name="Picture 12" descr="Setting up Alerts using Application Insights (the new ones) | by Nick  Chapsas | ASOS Tech Blog | Medium">
-            <a:extLst>
-              <a:ext uri="{FF2B5EF4-FFF2-40B4-BE49-F238E27FC236}">
-                <a16:creationId xmlns:a16="http://schemas.microsoft.com/office/drawing/2014/main" id="{DEFEF77F-F69F-FEC6-5D36-161B9AE1F725}"/>
-              </a:ext>
-            </a:extLst>
-          </p:cNvPr>
-          <p:cNvPicPr>
-            <a:picLocks noChangeAspect="1" noChangeArrowheads="1"/>
-          </p:cNvPicPr>
-          <p:nvPr/>
-        </p:nvPicPr>
-        <p:blipFill rotWithShape="1">
-          <a:blip r:embed="rId8">
-            <a:extLst>
-              <a:ext uri="{28A0092B-C50C-407E-A947-70E740481C1C}">
-                <a14:useLocalDpi xmlns:a14="http://schemas.microsoft.com/office/drawing/2010/main" val="0"/>
-              </a:ext>
-            </a:extLst>
-          </a:blip>
-          <a:srcRect l="31207" t="-3542" r="32143" b="-9810"/>
-          <a:stretch/>
-        </p:blipFill>
-        <p:spPr bwMode="auto">
-          <a:xfrm>
-            <a:off x="5027807" y="4536391"/>
-            <a:ext cx="697241" cy="1132113"/>
-          </a:xfrm>
-          <a:prstGeom prst="rect">
-            <a:avLst/>
-          </a:prstGeom>
-          <a:noFill/>
-          <a:extLst>
-            <a:ext uri="{909E8E84-426E-40DD-AFC4-6F175D3DCCD1}">
-              <a14:hiddenFill xmlns:a14="http://schemas.microsoft.com/office/drawing/2010/main">
-                <a:solidFill>
-                  <a:srgbClr val="FFFFFF"/>
-                </a:solidFill>
-              </a14:hiddenFill>
-            </a:ext>
-          </a:extLst>
-        </p:spPr>
-      </p:pic>
       <p:cxnSp>
         <p:nvCxnSpPr>
           <p:cNvPr id="16" name="Straight Arrow Connector 15">
@@ -4186,13 +3954,12 @@
           <p:cNvCxnSpPr>
             <a:cxnSpLocks/>
             <a:stCxn id="1034" idx="2"/>
-            <a:endCxn id="1030" idx="0"/>
           </p:cNvCxnSpPr>
           <p:nvPr/>
         </p:nvCxnSpPr>
         <p:spPr>
           <a:xfrm>
-            <a:off x="5376428" y="1749647"/>
+            <a:off x="3253385" y="1102172"/>
             <a:ext cx="1" cy="650470"/>
           </a:xfrm>
           <a:prstGeom prst="straightConnector1">
@@ -4228,15 +3995,15 @@
           </p:cNvPr>
           <p:cNvCxnSpPr>
             <a:cxnSpLocks/>
-            <a:stCxn id="1030" idx="2"/>
-            <a:endCxn id="1036" idx="0"/>
+            <a:stCxn id="1049" idx="2"/>
+            <a:endCxn id="20" idx="0"/>
           </p:cNvCxnSpPr>
           <p:nvPr/>
         </p:nvCxnSpPr>
         <p:spPr>
           <a:xfrm flipH="1">
-            <a:off x="5376428" y="3653137"/>
-            <a:ext cx="1" cy="883254"/>
+            <a:off x="4564266" y="3350384"/>
+            <a:ext cx="1" cy="783342"/>
           </a:xfrm>
           <a:prstGeom prst="straightConnector1">
             <a:avLst/>
@@ -4274,7 +4041,7 @@
         </p:nvSpPr>
         <p:spPr>
           <a:xfrm>
-            <a:off x="100869" y="1821709"/>
+            <a:off x="0" y="1201689"/>
             <a:ext cx="1308710" cy="646331"/>
           </a:xfrm>
           <a:prstGeom prst="rect">
@@ -4319,7 +4086,7 @@
           <p:nvPr/>
         </p:nvPicPr>
         <p:blipFill rotWithShape="1">
-          <a:blip r:embed="rId9">
+          <a:blip r:embed="rId6">
             <a:extLst>
               <a:ext uri="{28A0092B-C50C-407E-A947-70E740481C1C}">
                 <a14:useLocalDpi xmlns:a14="http://schemas.microsoft.com/office/drawing/2010/main" val="0"/>
@@ -4331,7 +4098,7 @@
         </p:blipFill>
         <p:spPr bwMode="auto">
           <a:xfrm>
-            <a:off x="2209883" y="744739"/>
+            <a:off x="1530314" y="152641"/>
             <a:ext cx="1002953" cy="991656"/>
           </a:xfrm>
           <a:prstGeom prst="rect">
@@ -4360,14 +4127,13 @@
           </p:cNvPr>
           <p:cNvCxnSpPr>
             <a:cxnSpLocks/>
-            <a:stCxn id="1026" idx="0"/>
             <a:endCxn id="1038" idx="2"/>
           </p:cNvCxnSpPr>
           <p:nvPr/>
         </p:nvCxnSpPr>
         <p:spPr>
           <a:xfrm flipH="1" flipV="1">
-            <a:off x="2711360" y="1736395"/>
+            <a:off x="2031791" y="1144297"/>
             <a:ext cx="1" cy="611979"/>
           </a:xfrm>
           <a:prstGeom prst="straightConnector1">
@@ -4407,8 +4173,8 @@
         </p:nvSpPr>
         <p:spPr>
           <a:xfrm>
-            <a:off x="1759465" y="3607789"/>
-            <a:ext cx="1818114" cy="646331"/>
+            <a:off x="2053024" y="3275288"/>
+            <a:ext cx="2613989" cy="369332"/>
           </a:xfrm>
           <a:prstGeom prst="rect">
             <a:avLst/>
@@ -4424,7 +4190,7 @@
             <a:pPr algn="ctr"/>
             <a:r>
               <a:rPr lang="en-US" b="1" dirty="0"/>
-              <a:t>Azure Static Web App</a:t>
+              <a:t>Azure Container App</a:t>
             </a:r>
           </a:p>
         </p:txBody>
@@ -4443,7 +4209,7 @@
         </p:nvSpPr>
         <p:spPr>
           <a:xfrm>
-            <a:off x="2636436" y="649800"/>
+            <a:off x="371574" y="45909"/>
             <a:ext cx="1818114" cy="369332"/>
           </a:xfrm>
           <a:prstGeom prst="rect">
@@ -4483,7 +4249,7 @@
         </p:nvSpPr>
         <p:spPr>
           <a:xfrm>
-            <a:off x="5407533" y="649800"/>
+            <a:off x="3284490" y="2325"/>
             <a:ext cx="1326342" cy="646331"/>
           </a:xfrm>
           <a:prstGeom prst="rect">
@@ -4519,7 +4285,7 @@
         </p:nvSpPr>
         <p:spPr>
           <a:xfrm>
-            <a:off x="5339306" y="1815091"/>
+            <a:off x="3216263" y="1167616"/>
             <a:ext cx="929561" cy="461665"/>
           </a:xfrm>
           <a:prstGeom prst="rect">
@@ -4536,7 +4302,7 @@
             <a:pPr algn="ctr"/>
             <a:r>
               <a:rPr lang="en-US" sz="1200" dirty="0"/>
-              <a:t>Providers API Keys</a:t>
+              <a:t>Secrets, API Keys</a:t>
             </a:r>
           </a:p>
         </p:txBody>
@@ -4555,8 +4321,8 @@
         </p:nvSpPr>
         <p:spPr>
           <a:xfrm>
-            <a:off x="5623441" y="2558852"/>
-            <a:ext cx="2136025" cy="461665"/>
+            <a:off x="5538948" y="1600791"/>
+            <a:ext cx="2136025" cy="276999"/>
           </a:xfrm>
           <a:prstGeom prst="rect">
             <a:avLst/>
@@ -4571,29 +4337,18 @@
           <a:p>
             <a:pPr algn="ctr"/>
             <a:r>
-              <a:rPr lang="en-US" sz="1200" dirty="0" err="1"/>
-              <a:t>OpenAI</a:t>
-            </a:r>
-            <a:r>
               <a:rPr lang="en-US" sz="1200" dirty="0"/>
-              <a:t> Chat </a:t>
-            </a:r>
-            <a:br>
-              <a:rPr lang="en-US" sz="1200" dirty="0"/>
-            </a:br>
-            <a:r>
-              <a:rPr lang="en-US" sz="1200" dirty="0"/>
-              <a:t>Completions API</a:t>
-            </a:r>
-          </a:p>
-        </p:txBody>
-      </p:sp>
-      <p:sp>
-        <p:nvSpPr>
-          <p:cNvPr id="45" name="TextBox 44">
-            <a:extLst>
-              <a:ext uri="{FF2B5EF4-FFF2-40B4-BE49-F238E27FC236}">
-                <a16:creationId xmlns:a16="http://schemas.microsoft.com/office/drawing/2014/main" id="{45C032A3-E1BC-98D3-0AF3-FFBAB8AC3C00}"/>
+              <a:t>Chat Completions API</a:t>
+            </a:r>
+          </a:p>
+        </p:txBody>
+      </p:sp>
+      <p:sp>
+        <p:nvSpPr>
+          <p:cNvPr id="46" name="TextBox 45">
+            <a:extLst>
+              <a:ext uri="{FF2B5EF4-FFF2-40B4-BE49-F238E27FC236}">
+                <a16:creationId xmlns:a16="http://schemas.microsoft.com/office/drawing/2014/main" id="{F16AF78A-7EAF-B304-889B-2EEFBE3B4950}"/>
               </a:ext>
             </a:extLst>
           </p:cNvPr>
@@ -4602,8 +4357,8 @@
         </p:nvSpPr>
         <p:spPr>
           <a:xfrm>
-            <a:off x="4467370" y="5522132"/>
-            <a:ext cx="1818114" cy="646331"/>
+            <a:off x="4541407" y="3534816"/>
+            <a:ext cx="2089229" cy="461665"/>
           </a:xfrm>
           <a:prstGeom prst="rect">
             <a:avLst/>
@@ -4616,42 +4371,6 @@
           </a:bodyPr>
           <a:lstStyle/>
           <a:p>
-            <a:pPr algn="ctr"/>
-            <a:r>
-              <a:rPr lang="en-US" b="1" dirty="0"/>
-              <a:t>Application Insights</a:t>
-            </a:r>
-          </a:p>
-        </p:txBody>
-      </p:sp>
-      <p:sp>
-        <p:nvSpPr>
-          <p:cNvPr id="46" name="TextBox 45">
-            <a:extLst>
-              <a:ext uri="{FF2B5EF4-FFF2-40B4-BE49-F238E27FC236}">
-                <a16:creationId xmlns:a16="http://schemas.microsoft.com/office/drawing/2014/main" id="{F16AF78A-7EAF-B304-889B-2EEFBE3B4950}"/>
-              </a:ext>
-            </a:extLst>
-          </p:cNvPr>
-          <p:cNvSpPr txBox="1"/>
-          <p:nvPr/>
-        </p:nvSpPr>
-        <p:spPr>
-          <a:xfrm>
-            <a:off x="5336760" y="3872245"/>
-            <a:ext cx="2089229" cy="461665"/>
-          </a:xfrm>
-          <a:prstGeom prst="rect">
-            <a:avLst/>
-          </a:prstGeom>
-          <a:noFill/>
-        </p:spPr>
-        <p:txBody>
-          <a:bodyPr wrap="square" rtlCol="0">
-            <a:spAutoFit/>
-          </a:bodyPr>
-          <a:lstStyle/>
-          <a:p>
             <a:r>
               <a:rPr lang="en-US" sz="1200" dirty="0"/>
               <a:t>API Request Logs </a:t>
@@ -4668,10 +4387,10 @@
       </p:sp>
       <p:sp>
         <p:nvSpPr>
-          <p:cNvPr id="47" name="TextBox 46">
-            <a:extLst>
-              <a:ext uri="{FF2B5EF4-FFF2-40B4-BE49-F238E27FC236}">
-                <a16:creationId xmlns:a16="http://schemas.microsoft.com/office/drawing/2014/main" id="{881D03DB-F860-9066-FC67-62AB2EBD8441}"/>
+          <p:cNvPr id="49" name="TextBox 48">
+            <a:extLst>
+              <a:ext uri="{FF2B5EF4-FFF2-40B4-BE49-F238E27FC236}">
+                <a16:creationId xmlns:a16="http://schemas.microsoft.com/office/drawing/2014/main" id="{ED4B1590-C14E-309A-8F14-7F46D68936A5}"/>
               </a:ext>
             </a:extLst>
           </p:cNvPr>
@@ -4680,78 +4399,7 @@
         </p:nvSpPr>
         <p:spPr>
           <a:xfrm>
-            <a:off x="3515330" y="2575998"/>
-            <a:ext cx="1357005" cy="461665"/>
-          </a:xfrm>
-          <a:prstGeom prst="rect">
-            <a:avLst/>
-          </a:prstGeom>
-          <a:noFill/>
-        </p:spPr>
-        <p:txBody>
-          <a:bodyPr wrap="square" rtlCol="0">
-            <a:spAutoFit/>
-          </a:bodyPr>
-          <a:lstStyle/>
-          <a:p>
-            <a:r>
-              <a:rPr lang="en-US" sz="1200" dirty="0"/>
-              <a:t>Azure SWA API “link” to APIM</a:t>
-            </a:r>
-          </a:p>
-        </p:txBody>
-      </p:sp>
-      <p:sp>
-        <p:nvSpPr>
-          <p:cNvPr id="48" name="TextBox 47">
-            <a:extLst>
-              <a:ext uri="{FF2B5EF4-FFF2-40B4-BE49-F238E27FC236}">
-                <a16:creationId xmlns:a16="http://schemas.microsoft.com/office/drawing/2014/main" id="{0834FA5C-F679-6CCC-B1DB-24ED21A11A8B}"/>
-              </a:ext>
-            </a:extLst>
-          </p:cNvPr>
-          <p:cNvSpPr txBox="1"/>
-          <p:nvPr/>
-        </p:nvSpPr>
-        <p:spPr>
-          <a:xfrm>
-            <a:off x="5569674" y="3191471"/>
-            <a:ext cx="1818114" cy="646331"/>
-          </a:xfrm>
-          <a:prstGeom prst="rect">
-            <a:avLst/>
-          </a:prstGeom>
-          <a:noFill/>
-        </p:spPr>
-        <p:txBody>
-          <a:bodyPr wrap="square" rtlCol="0">
-            <a:spAutoFit/>
-          </a:bodyPr>
-          <a:lstStyle/>
-          <a:p>
-            <a:pPr algn="ctr"/>
-            <a:r>
-              <a:rPr lang="en-US" b="1" dirty="0"/>
-              <a:t>Azure API Management</a:t>
-            </a:r>
-          </a:p>
-        </p:txBody>
-      </p:sp>
-      <p:sp>
-        <p:nvSpPr>
-          <p:cNvPr id="49" name="TextBox 48">
-            <a:extLst>
-              <a:ext uri="{FF2B5EF4-FFF2-40B4-BE49-F238E27FC236}">
-                <a16:creationId xmlns:a16="http://schemas.microsoft.com/office/drawing/2014/main" id="{ED4B1590-C14E-309A-8F14-7F46D68936A5}"/>
-              </a:ext>
-            </a:extLst>
-          </p:cNvPr>
-          <p:cNvSpPr txBox="1"/>
-          <p:nvPr/>
-        </p:nvSpPr>
-        <p:spPr>
-          <a:xfrm>
-            <a:off x="2720089" y="1818295"/>
+            <a:off x="1990211" y="1166268"/>
             <a:ext cx="1308707" cy="461665"/>
           </a:xfrm>
           <a:prstGeom prst="rect">
@@ -4787,7 +4435,7 @@
           <p:nvPr/>
         </p:nvPicPr>
         <p:blipFill rotWithShape="1">
-          <a:blip r:embed="rId10">
+          <a:blip r:embed="rId7">
             <a:extLst>
               <a:ext uri="{28A0092B-C50C-407E-A947-70E740481C1C}">
                 <a14:useLocalDpi xmlns:a14="http://schemas.microsoft.com/office/drawing/2010/main" val="0"/>
@@ -4799,7 +4447,7 @@
         </p:blipFill>
         <p:spPr bwMode="auto">
           <a:xfrm>
-            <a:off x="1784045" y="4961672"/>
+            <a:off x="1122333" y="5484799"/>
             <a:ext cx="1731285" cy="1206791"/>
           </a:xfrm>
           <a:prstGeom prst="rect">
@@ -4828,15 +4476,15 @@
           </p:cNvPr>
           <p:cNvCxnSpPr>
             <a:cxnSpLocks/>
-            <a:stCxn id="1040" idx="0"/>
-            <a:endCxn id="38" idx="2"/>
+            <a:stCxn id="37" idx="0"/>
+            <a:endCxn id="1047" idx="0"/>
           </p:cNvCxnSpPr>
           <p:nvPr/>
         </p:nvCxnSpPr>
         <p:spPr>
           <a:xfrm flipV="1">
-            <a:off x="2649688" y="4254120"/>
-            <a:ext cx="18834" cy="707552"/>
+            <a:off x="2007305" y="3318023"/>
+            <a:ext cx="5766" cy="795461"/>
           </a:xfrm>
           <a:prstGeom prst="straightConnector1">
             <a:avLst/>
@@ -4872,14 +4520,15 @@
           </p:cNvPr>
           <p:cNvCxnSpPr>
             <a:cxnSpLocks/>
-            <a:stCxn id="1036" idx="3"/>
+            <a:stCxn id="1062" idx="3"/>
+            <a:endCxn id="57" idx="1"/>
           </p:cNvCxnSpPr>
           <p:nvPr/>
         </p:nvCxnSpPr>
         <p:spPr>
           <a:xfrm>
-            <a:off x="5725048" y="5102448"/>
-            <a:ext cx="560436" cy="0"/>
+            <a:off x="5101025" y="4615590"/>
+            <a:ext cx="615602" cy="2513"/>
           </a:xfrm>
           <a:prstGeom prst="straightConnector1">
             <a:avLst/>
@@ -4918,7 +4567,7 @@
         </p:nvSpPr>
         <p:spPr>
           <a:xfrm>
-            <a:off x="2685139" y="4398710"/>
+            <a:off x="1983692" y="5130620"/>
             <a:ext cx="1818114" cy="461665"/>
           </a:xfrm>
           <a:prstGeom prst="rect">
@@ -4960,7 +4609,7 @@
         </p:nvSpPr>
         <p:spPr>
           <a:xfrm>
-            <a:off x="6268868" y="4895621"/>
+            <a:off x="5716627" y="4387270"/>
             <a:ext cx="1818114" cy="461665"/>
           </a:xfrm>
           <a:prstGeom prst="rect">
@@ -4990,10 +4639,10 @@
       </p:sp>
       <p:pic>
         <p:nvPicPr>
-          <p:cNvPr id="4" name="Picture 2" descr="Azure Container Apps - Pricing | Microsoft Azure">
-            <a:extLst>
-              <a:ext uri="{FF2B5EF4-FFF2-40B4-BE49-F238E27FC236}">
-                <a16:creationId xmlns:a16="http://schemas.microsoft.com/office/drawing/2014/main" id="{0A118580-7827-C2CD-B30D-894E5CB01FDB}"/>
+          <p:cNvPr id="9" name="Picture 6">
+            <a:extLst>
+              <a:ext uri="{FF2B5EF4-FFF2-40B4-BE49-F238E27FC236}">
+                <a16:creationId xmlns:a16="http://schemas.microsoft.com/office/drawing/2014/main" id="{099EB20A-37A0-6E1A-89C5-B0715CEDB094}"/>
               </a:ext>
             </a:extLst>
           </p:cNvPr>
@@ -5003,7 +4652,7 @@
           <p:nvPr/>
         </p:nvPicPr>
         <p:blipFill>
-          <a:blip r:embed="rId11">
+          <a:blip r:embed="rId8">
             <a:extLst>
               <a:ext uri="{28A0092B-C50C-407E-A947-70E740481C1C}">
                 <a14:useLocalDpi xmlns:a14="http://schemas.microsoft.com/office/drawing/2010/main" val="0"/>
@@ -5017,8 +4666,8 @@
         </p:blipFill>
         <p:spPr bwMode="auto">
           <a:xfrm>
-            <a:off x="8952071" y="3396527"/>
-            <a:ext cx="866655" cy="454994"/>
+            <a:off x="9869471" y="2489490"/>
+            <a:ext cx="2079453" cy="233938"/>
           </a:xfrm>
           <a:prstGeom prst="rect">
             <a:avLst/>
@@ -5035,196 +4684,112 @@
           </a:extLst>
         </p:spPr>
       </p:pic>
-      <p:pic>
-        <p:nvPicPr>
-          <p:cNvPr id="7" name="Picture 4" descr="Portkey | Lightspeed | Venture Capital">
-            <a:extLst>
-              <a:ext uri="{FF2B5EF4-FFF2-40B4-BE49-F238E27FC236}">
-                <a16:creationId xmlns:a16="http://schemas.microsoft.com/office/drawing/2014/main" id="{3A0E9E4A-1143-87A3-4592-F2E55AA6A1D7}"/>
-              </a:ext>
-            </a:extLst>
-          </p:cNvPr>
-          <p:cNvPicPr>
-            <a:picLocks noChangeAspect="1" noChangeArrowheads="1"/>
-          </p:cNvPicPr>
+      <p:sp>
+        <p:nvSpPr>
+          <p:cNvPr id="25" name="TextBox 24">
+            <a:extLst>
+              <a:ext uri="{FF2B5EF4-FFF2-40B4-BE49-F238E27FC236}">
+                <a16:creationId xmlns:a16="http://schemas.microsoft.com/office/drawing/2014/main" id="{3D0A269C-A34B-A63C-B372-A42EEBAD68BF}"/>
+              </a:ext>
+            </a:extLst>
+          </p:cNvPr>
+          <p:cNvSpPr txBox="1"/>
           <p:nvPr/>
-        </p:nvPicPr>
-        <p:blipFill>
-          <a:blip r:embed="rId12">
-            <a:extLst>
-              <a:ext uri="{28A0092B-C50C-407E-A947-70E740481C1C}">
-                <a14:useLocalDpi xmlns:a14="http://schemas.microsoft.com/office/drawing/2010/main" val="0"/>
-              </a:ext>
-            </a:extLst>
-          </a:blip>
-          <a:srcRect/>
-          <a:stretch>
-            <a:fillRect/>
-          </a:stretch>
-        </p:blipFill>
-        <p:spPr bwMode="auto">
-          <a:xfrm>
-            <a:off x="7449041" y="2747936"/>
-            <a:ext cx="1859315" cy="507196"/>
+        </p:nvSpPr>
+        <p:spPr>
+          <a:xfrm>
+            <a:off x="313348" y="3779601"/>
+            <a:ext cx="1707394" cy="276999"/>
           </a:xfrm>
           <a:prstGeom prst="rect">
             <a:avLst/>
           </a:prstGeom>
           <a:noFill/>
-          <a:extLst>
-            <a:ext uri="{909E8E84-426E-40DD-AFC4-6F175D3DCCD1}">
-              <a14:hiddenFill xmlns:a14="http://schemas.microsoft.com/office/drawing/2010/main">
-                <a:solidFill>
-                  <a:srgbClr val="FFFFFF"/>
-                </a:solidFill>
-              </a14:hiddenFill>
-            </a:ext>
-          </a:extLst>
-        </p:spPr>
-      </p:pic>
-      <p:pic>
-        <p:nvPicPr>
-          <p:cNvPr id="9" name="Picture 6">
-            <a:extLst>
-              <a:ext uri="{FF2B5EF4-FFF2-40B4-BE49-F238E27FC236}">
-                <a16:creationId xmlns:a16="http://schemas.microsoft.com/office/drawing/2014/main" id="{099EB20A-37A0-6E1A-89C5-B0715CEDB094}"/>
-              </a:ext>
-            </a:extLst>
-          </p:cNvPr>
-          <p:cNvPicPr>
-            <a:picLocks noChangeAspect="1" noChangeArrowheads="1"/>
-          </p:cNvPicPr>
+        </p:spPr>
+        <p:txBody>
+          <a:bodyPr wrap="square" rtlCol="0">
+            <a:spAutoFit/>
+          </a:bodyPr>
+          <a:lstStyle/>
+          <a:p>
+            <a:pPr algn="r"/>
+            <a:r>
+              <a:rPr lang="en-US" sz="1200" dirty="0"/>
+              <a:t>docker Image</a:t>
+            </a:r>
+          </a:p>
+        </p:txBody>
+      </p:sp>
+      <p:sp>
+        <p:nvSpPr>
+          <p:cNvPr id="44" name="TextBox 43">
+            <a:hlinkClick r:id="rId9"/>
+            <a:extLst>
+              <a:ext uri="{FF2B5EF4-FFF2-40B4-BE49-F238E27FC236}">
+                <a16:creationId xmlns:a16="http://schemas.microsoft.com/office/drawing/2014/main" id="{0BC872F0-F971-18C4-9CDF-7C7DC799D211}"/>
+              </a:ext>
+            </a:extLst>
+          </p:cNvPr>
+          <p:cNvSpPr txBox="1"/>
           <p:nvPr/>
-        </p:nvPicPr>
-        <p:blipFill>
-          <a:blip r:embed="rId13">
-            <a:extLst>
-              <a:ext uri="{28A0092B-C50C-407E-A947-70E740481C1C}">
-                <a14:useLocalDpi xmlns:a14="http://schemas.microsoft.com/office/drawing/2010/main" val="0"/>
-              </a:ext>
-            </a:extLst>
-          </a:blip>
-          <a:srcRect/>
-          <a:stretch>
-            <a:fillRect/>
-          </a:stretch>
-        </p:blipFill>
-        <p:spPr bwMode="auto">
-          <a:xfrm>
-            <a:off x="10035574" y="3734552"/>
-            <a:ext cx="2079453" cy="233938"/>
+        </p:nvSpPr>
+        <p:spPr>
+          <a:xfrm>
+            <a:off x="2412553" y="5942381"/>
+            <a:ext cx="6097904" cy="246221"/>
           </a:xfrm>
           <a:prstGeom prst="rect">
             <a:avLst/>
           </a:prstGeom>
           <a:noFill/>
-          <a:extLst>
-            <a:ext uri="{909E8E84-426E-40DD-AFC4-6F175D3DCCD1}">
-              <a14:hiddenFill xmlns:a14="http://schemas.microsoft.com/office/drawing/2010/main">
-                <a:solidFill>
-                  <a:srgbClr val="FFFFFF"/>
-                </a:solidFill>
-              </a14:hiddenFill>
-            </a:ext>
-          </a:extLst>
-        </p:spPr>
-      </p:pic>
-      <p:sp>
-        <p:nvSpPr>
-          <p:cNvPr id="10" name="TextBox 9">
-            <a:extLst>
-              <a:ext uri="{FF2B5EF4-FFF2-40B4-BE49-F238E27FC236}">
-                <a16:creationId xmlns:a16="http://schemas.microsoft.com/office/drawing/2014/main" id="{57700EB3-35B3-FF11-88CD-4620EFA46369}"/>
-              </a:ext>
-            </a:extLst>
-          </p:cNvPr>
-          <p:cNvSpPr txBox="1"/>
-          <p:nvPr/>
-        </p:nvSpPr>
-        <p:spPr>
-          <a:xfrm>
-            <a:off x="7574172" y="3097799"/>
-            <a:ext cx="2169762" cy="276999"/>
-          </a:xfrm>
-          <a:prstGeom prst="rect">
-            <a:avLst/>
-          </a:prstGeom>
-          <a:noFill/>
-        </p:spPr>
-        <p:txBody>
-          <a:bodyPr wrap="square" rtlCol="0">
+        </p:spPr>
+        <p:txBody>
+          <a:bodyPr wrap="square">
             <a:spAutoFit/>
           </a:bodyPr>
           <a:lstStyle/>
           <a:p>
-            <a:pPr algn="ctr"/>
-            <a:r>
-              <a:rPr lang="en-US" sz="1200" b="1" dirty="0"/>
-              <a:t>LLM API Gateway</a:t>
-            </a:r>
-          </a:p>
-        </p:txBody>
-      </p:sp>
-      <p:sp>
-        <p:nvSpPr>
-          <p:cNvPr id="25" name="TextBox 24">
-            <a:extLst>
-              <a:ext uri="{FF2B5EF4-FFF2-40B4-BE49-F238E27FC236}">
-                <a16:creationId xmlns:a16="http://schemas.microsoft.com/office/drawing/2014/main" id="{3D0A269C-A34B-A63C-B372-A42EEBAD68BF}"/>
-              </a:ext>
-            </a:extLst>
-          </p:cNvPr>
-          <p:cNvSpPr txBox="1"/>
-          <p:nvPr/>
-        </p:nvSpPr>
-        <p:spPr>
-          <a:xfrm>
-            <a:off x="7946777" y="3837802"/>
-            <a:ext cx="1707394" cy="461665"/>
-          </a:xfrm>
-          <a:prstGeom prst="rect">
-            <a:avLst/>
-          </a:prstGeom>
-          <a:noFill/>
-        </p:spPr>
-        <p:txBody>
-          <a:bodyPr wrap="square" rtlCol="0">
-            <a:spAutoFit/>
-          </a:bodyPr>
-          <a:lstStyle/>
-          <a:p>
-            <a:pPr algn="r"/>
-            <a:r>
-              <a:rPr lang="en-US" sz="1200" b="1" dirty="0"/>
-              <a:t>Docker Image in Azure Container App</a:t>
+            <a:r>
+              <a:rPr lang="en-US" sz="1000" dirty="0"/>
+              <a:t>https://</a:t>
+            </a:r>
+            <a:r>
+              <a:rPr lang="en-US" sz="1000" dirty="0" err="1"/>
+              <a:t>github.com</a:t>
+            </a:r>
+            <a:r>
+              <a:rPr lang="en-US" sz="1000" dirty="0"/>
+              <a:t>/DmitriyAlergant-T1A/BetterChatGPT-t1a</a:t>
             </a:r>
           </a:p>
         </p:txBody>
       </p:sp>
       <p:cxnSp>
         <p:nvCxnSpPr>
-          <p:cNvPr id="12" name="Straight Arrow Connector 11">
-            <a:extLst>
-              <a:ext uri="{FF2B5EF4-FFF2-40B4-BE49-F238E27FC236}">
-                <a16:creationId xmlns:a16="http://schemas.microsoft.com/office/drawing/2014/main" id="{120DF10C-DD91-047C-82ED-15733462FFBB}"/>
+          <p:cNvPr id="6" name="Straight Arrow Connector 5">
+            <a:extLst>
+              <a:ext uri="{FF2B5EF4-FFF2-40B4-BE49-F238E27FC236}">
+                <a16:creationId xmlns:a16="http://schemas.microsoft.com/office/drawing/2014/main" id="{2FA4FACF-88FB-4D73-4E96-3E18884CE62D}"/>
               </a:ext>
             </a:extLst>
           </p:cNvPr>
           <p:cNvCxnSpPr>
             <a:cxnSpLocks/>
-            <a:stCxn id="1030" idx="3"/>
+            <a:stCxn id="1040" idx="0"/>
+            <a:endCxn id="1043" idx="3"/>
           </p:cNvCxnSpPr>
           <p:nvPr/>
         </p:nvCxnSpPr>
         <p:spPr>
           <a:xfrm flipV="1">
-            <a:off x="6030783" y="3018615"/>
-            <a:ext cx="1508368" cy="8012"/>
+            <a:off x="1987976" y="5134703"/>
+            <a:ext cx="0" cy="350096"/>
           </a:xfrm>
           <a:prstGeom prst="straightConnector1">
             <a:avLst/>
           </a:prstGeom>
           <a:ln>
+            <a:prstDash val="dash"/>
             <a:tailEnd type="triangle"/>
           </a:ln>
         </p:spPr>
@@ -5245,22 +4810,512 @@
       </p:cxnSp>
       <p:cxnSp>
         <p:nvCxnSpPr>
-          <p:cNvPr id="27" name="Straight Arrow Connector 26">
-            <a:extLst>
-              <a:ext uri="{FF2B5EF4-FFF2-40B4-BE49-F238E27FC236}">
-                <a16:creationId xmlns:a16="http://schemas.microsoft.com/office/drawing/2014/main" id="{C8156C35-42DC-B2FE-7E9E-6936093105AC}"/>
+          <p:cNvPr id="17" name="Straight Arrow Connector 16">
+            <a:extLst>
+              <a:ext uri="{FF2B5EF4-FFF2-40B4-BE49-F238E27FC236}">
+                <a16:creationId xmlns:a16="http://schemas.microsoft.com/office/drawing/2014/main" id="{1DAE2FB5-D45A-CF31-74E6-58334864645F}"/>
               </a:ext>
             </a:extLst>
           </p:cNvPr>
           <p:cNvCxnSpPr>
             <a:cxnSpLocks/>
+            <a:stCxn id="55" idx="1"/>
+            <a:endCxn id="9" idx="1"/>
           </p:cNvCxnSpPr>
           <p:nvPr/>
         </p:nvCxnSpPr>
         <p:spPr>
-          <a:xfrm flipV="1">
-            <a:off x="9485555" y="2372786"/>
-            <a:ext cx="660627" cy="546599"/>
+          <a:xfrm>
+            <a:off x="4825765" y="2583600"/>
+            <a:ext cx="5043706" cy="22859"/>
+          </a:xfrm>
+          <a:prstGeom prst="straightConnector1">
+            <a:avLst/>
+          </a:prstGeom>
+          <a:ln>
+            <a:tailEnd type="triangle"/>
+          </a:ln>
+        </p:spPr>
+        <p:style>
+          <a:lnRef idx="2">
+            <a:schemeClr val="accent1"/>
+          </a:lnRef>
+          <a:fillRef idx="0">
+            <a:schemeClr val="accent1"/>
+          </a:fillRef>
+          <a:effectRef idx="1">
+            <a:schemeClr val="accent1"/>
+          </a:effectRef>
+          <a:fontRef idx="minor">
+            <a:schemeClr val="tx1"/>
+          </a:fontRef>
+        </p:style>
+      </p:cxnSp>
+      <p:pic>
+        <p:nvPicPr>
+          <p:cNvPr id="20" name="Picture 2" descr="How to send Azure's activity logs to Log Analytics Workspace? | by Kumar  Allamraju | Medium">
+            <a:extLst>
+              <a:ext uri="{FF2B5EF4-FFF2-40B4-BE49-F238E27FC236}">
+                <a16:creationId xmlns:a16="http://schemas.microsoft.com/office/drawing/2014/main" id="{EABBA8ED-9B39-84DE-C20E-E470396B30BB}"/>
+              </a:ext>
+            </a:extLst>
+          </p:cNvPr>
+          <p:cNvPicPr>
+            <a:picLocks noChangeAspect="1" noChangeArrowheads="1"/>
+          </p:cNvPicPr>
+          <p:nvPr/>
+        </p:nvPicPr>
+        <p:blipFill>
+          <a:blip r:embed="rId10">
+            <a:clrChange>
+              <a:clrFrom>
+                <a:srgbClr val="FFFFFF"/>
+              </a:clrFrom>
+              <a:clrTo>
+                <a:srgbClr val="FFFFFF">
+                  <a:alpha val="0"/>
+                </a:srgbClr>
+              </a:clrTo>
+            </a:clrChange>
+            <a:extLst>
+              <a:ext uri="{28A0092B-C50C-407E-A947-70E740481C1C}">
+                <a14:useLocalDpi xmlns:a14="http://schemas.microsoft.com/office/drawing/2010/main" val="0"/>
+              </a:ext>
+            </a:extLst>
+          </a:blip>
+          <a:srcRect/>
+          <a:stretch>
+            <a:fillRect/>
+          </a:stretch>
+        </p:blipFill>
+        <p:spPr bwMode="auto">
+          <a:xfrm>
+            <a:off x="3882199" y="4133726"/>
+            <a:ext cx="1364133" cy="1104948"/>
+          </a:xfrm>
+          <a:prstGeom prst="rect">
+            <a:avLst/>
+          </a:prstGeom>
+          <a:noFill/>
+          <a:extLst>
+            <a:ext uri="{909E8E84-426E-40DD-AFC4-6F175D3DCCD1}">
+              <a14:hiddenFill xmlns:a14="http://schemas.microsoft.com/office/drawing/2010/main">
+                <a:solidFill>
+                  <a:srgbClr val="FFFFFF"/>
+                </a:solidFill>
+              </a14:hiddenFill>
+            </a:ext>
+          </a:extLst>
+        </p:spPr>
+      </p:pic>
+      <p:sp>
+        <p:nvSpPr>
+          <p:cNvPr id="30" name="Rectangle 29">
+            <a:extLst>
+              <a:ext uri="{FF2B5EF4-FFF2-40B4-BE49-F238E27FC236}">
+                <a16:creationId xmlns:a16="http://schemas.microsoft.com/office/drawing/2014/main" id="{1266EE85-B5D1-C92A-9D59-1DDE8F7908B7}"/>
+              </a:ext>
+            </a:extLst>
+          </p:cNvPr>
+          <p:cNvSpPr/>
+          <p:nvPr/>
+        </p:nvSpPr>
+        <p:spPr>
+          <a:xfrm>
+            <a:off x="1804948" y="1733779"/>
+            <a:ext cx="3020754" cy="1584898"/>
+          </a:xfrm>
+          <a:prstGeom prst="rect">
+            <a:avLst/>
+          </a:prstGeom>
+          <a:solidFill>
+            <a:schemeClr val="bg1"/>
+          </a:solidFill>
+        </p:spPr>
+        <p:style>
+          <a:lnRef idx="2">
+            <a:schemeClr val="accent1">
+              <a:shade val="15000"/>
+            </a:schemeClr>
+          </a:lnRef>
+          <a:fillRef idx="1">
+            <a:schemeClr val="accent1"/>
+          </a:fillRef>
+          <a:effectRef idx="0">
+            <a:schemeClr val="accent1"/>
+          </a:effectRef>
+          <a:fontRef idx="minor">
+            <a:schemeClr val="lt1"/>
+          </a:fontRef>
+        </p:style>
+        <p:txBody>
+          <a:bodyPr rtlCol="0" anchor="ctr"/>
+          <a:lstStyle/>
+          <a:p>
+            <a:pPr algn="ctr"/>
+            <a:endParaRPr lang="en-US"/>
+          </a:p>
+        </p:txBody>
+      </p:sp>
+      <p:sp>
+        <p:nvSpPr>
+          <p:cNvPr id="36" name="Rectangle 35">
+            <a:extLst>
+              <a:ext uri="{FF2B5EF4-FFF2-40B4-BE49-F238E27FC236}">
+                <a16:creationId xmlns:a16="http://schemas.microsoft.com/office/drawing/2014/main" id="{05C8898A-93D3-58C1-F48F-342DBBBF11DC}"/>
+              </a:ext>
+            </a:extLst>
+          </p:cNvPr>
+          <p:cNvSpPr/>
+          <p:nvPr/>
+        </p:nvSpPr>
+        <p:spPr>
+          <a:xfrm>
+            <a:off x="2031790" y="2003525"/>
+            <a:ext cx="2579042" cy="1081227"/>
+          </a:xfrm>
+          <a:prstGeom prst="rect">
+            <a:avLst/>
+          </a:prstGeom>
+          <a:solidFill>
+            <a:schemeClr val="bg1"/>
+          </a:solidFill>
+        </p:spPr>
+        <p:style>
+          <a:lnRef idx="2">
+            <a:schemeClr val="accent1">
+              <a:shade val="15000"/>
+            </a:schemeClr>
+          </a:lnRef>
+          <a:fillRef idx="1">
+            <a:schemeClr val="accent1"/>
+          </a:fillRef>
+          <a:effectRef idx="0">
+            <a:schemeClr val="accent1"/>
+          </a:effectRef>
+          <a:fontRef idx="minor">
+            <a:schemeClr val="lt1"/>
+          </a:fontRef>
+        </p:style>
+        <p:txBody>
+          <a:bodyPr rtlCol="0" anchor="ctr"/>
+          <a:lstStyle/>
+          <a:p>
+            <a:pPr algn="ctr"/>
+            <a:endParaRPr lang="en-US"/>
+          </a:p>
+        </p:txBody>
+      </p:sp>
+      <p:pic>
+        <p:nvPicPr>
+          <p:cNvPr id="35" name="Picture 8">
+            <a:extLst>
+              <a:ext uri="{FF2B5EF4-FFF2-40B4-BE49-F238E27FC236}">
+                <a16:creationId xmlns:a16="http://schemas.microsoft.com/office/drawing/2014/main" id="{A129306C-34AC-B5D6-CEFC-649090034463}"/>
+              </a:ext>
+            </a:extLst>
+          </p:cNvPr>
+          <p:cNvPicPr>
+            <a:picLocks noChangeAspect="1" noChangeArrowheads="1"/>
+          </p:cNvPicPr>
+          <p:nvPr/>
+        </p:nvPicPr>
+        <p:blipFill>
+          <a:blip r:embed="rId11">
+            <a:extLst>
+              <a:ext uri="{28A0092B-C50C-407E-A947-70E740481C1C}">
+                <a14:useLocalDpi xmlns:a14="http://schemas.microsoft.com/office/drawing/2010/main" val="0"/>
+              </a:ext>
+            </a:extLst>
+          </a:blip>
+          <a:srcRect/>
+          <a:stretch>
+            <a:fillRect/>
+          </a:stretch>
+        </p:blipFill>
+        <p:spPr bwMode="auto">
+          <a:xfrm>
+            <a:off x="2725002" y="2615740"/>
+            <a:ext cx="1266563" cy="340884"/>
+          </a:xfrm>
+          <a:prstGeom prst="rect">
+            <a:avLst/>
+          </a:prstGeom>
+          <a:noFill/>
+          <a:extLst>
+            <a:ext uri="{909E8E84-426E-40DD-AFC4-6F175D3DCCD1}">
+              <a14:hiddenFill xmlns:a14="http://schemas.microsoft.com/office/drawing/2010/main">
+                <a:solidFill>
+                  <a:srgbClr val="FFFFFF"/>
+                </a:solidFill>
+              </a14:hiddenFill>
+            </a:ext>
+          </a:extLst>
+        </p:spPr>
+      </p:pic>
+      <p:pic>
+        <p:nvPicPr>
+          <p:cNvPr id="37" name="Picture 10" descr="Container Registry | Microsoft Azure Mono">
+            <a:extLst>
+              <a:ext uri="{FF2B5EF4-FFF2-40B4-BE49-F238E27FC236}">
+                <a16:creationId xmlns:a16="http://schemas.microsoft.com/office/drawing/2014/main" id="{CDCFECE0-3C09-7ED0-6EAF-3DAE8DDFF5BA}"/>
+              </a:ext>
+            </a:extLst>
+          </p:cNvPr>
+          <p:cNvPicPr>
+            <a:picLocks noChangeAspect="1" noChangeArrowheads="1"/>
+          </p:cNvPicPr>
+          <p:nvPr/>
+        </p:nvPicPr>
+        <p:blipFill>
+          <a:blip r:embed="rId12">
+            <a:extLst>
+              <a:ext uri="{28A0092B-C50C-407E-A947-70E740481C1C}">
+                <a14:useLocalDpi xmlns:a14="http://schemas.microsoft.com/office/drawing/2010/main" val="0"/>
+              </a:ext>
+            </a:extLst>
+          </a:blip>
+          <a:srcRect/>
+          <a:stretch>
+            <a:fillRect/>
+          </a:stretch>
+        </p:blipFill>
+        <p:spPr bwMode="auto">
+          <a:xfrm>
+            <a:off x="1511762" y="4113484"/>
+            <a:ext cx="991085" cy="882815"/>
+          </a:xfrm>
+          <a:prstGeom prst="rect">
+            <a:avLst/>
+          </a:prstGeom>
+          <a:noFill/>
+          <a:extLst>
+            <a:ext uri="{909E8E84-426E-40DD-AFC4-6F175D3DCCD1}">
+              <a14:hiddenFill xmlns:a14="http://schemas.microsoft.com/office/drawing/2010/main">
+                <a:solidFill>
+                  <a:srgbClr val="FFFFFF"/>
+                </a:solidFill>
+              </a14:hiddenFill>
+            </a:ext>
+          </a:extLst>
+        </p:spPr>
+      </p:pic>
+      <p:sp>
+        <p:nvSpPr>
+          <p:cNvPr id="54" name="Rectangle 53">
+            <a:extLst>
+              <a:ext uri="{FF2B5EF4-FFF2-40B4-BE49-F238E27FC236}">
+                <a16:creationId xmlns:a16="http://schemas.microsoft.com/office/drawing/2014/main" id="{4DCD34C0-E9EA-D93B-097A-D7F2386A2261}"/>
+              </a:ext>
+            </a:extLst>
+          </p:cNvPr>
+          <p:cNvSpPr/>
+          <p:nvPr/>
+        </p:nvSpPr>
+        <p:spPr>
+          <a:xfrm>
+            <a:off x="4825702" y="1843291"/>
+            <a:ext cx="45719" cy="45719"/>
+          </a:xfrm>
+          <a:prstGeom prst="rect">
+            <a:avLst/>
+          </a:prstGeom>
+          <a:noFill/>
+          <a:ln>
+            <a:noFill/>
+          </a:ln>
+        </p:spPr>
+        <p:style>
+          <a:lnRef idx="2">
+            <a:schemeClr val="accent1">
+              <a:shade val="15000"/>
+            </a:schemeClr>
+          </a:lnRef>
+          <a:fillRef idx="1">
+            <a:schemeClr val="accent1"/>
+          </a:fillRef>
+          <a:effectRef idx="0">
+            <a:schemeClr val="accent1"/>
+          </a:effectRef>
+          <a:fontRef idx="minor">
+            <a:schemeClr val="lt1"/>
+          </a:fontRef>
+        </p:style>
+        <p:txBody>
+          <a:bodyPr rtlCol="0" anchor="ctr"/>
+          <a:lstStyle/>
+          <a:p>
+            <a:pPr algn="ctr"/>
+            <a:endParaRPr lang="en-US"/>
+          </a:p>
+        </p:txBody>
+      </p:sp>
+      <p:sp>
+        <p:nvSpPr>
+          <p:cNvPr id="55" name="Rectangle 54">
+            <a:extLst>
+              <a:ext uri="{FF2B5EF4-FFF2-40B4-BE49-F238E27FC236}">
+                <a16:creationId xmlns:a16="http://schemas.microsoft.com/office/drawing/2014/main" id="{90465EBF-F2D1-FE0E-3A8D-5433CA2847F2}"/>
+              </a:ext>
+            </a:extLst>
+          </p:cNvPr>
+          <p:cNvSpPr/>
+          <p:nvPr/>
+        </p:nvSpPr>
+        <p:spPr>
+          <a:xfrm>
+            <a:off x="4825765" y="2560740"/>
+            <a:ext cx="45719" cy="45719"/>
+          </a:xfrm>
+          <a:prstGeom prst="rect">
+            <a:avLst/>
+          </a:prstGeom>
+          <a:noFill/>
+          <a:ln>
+            <a:noFill/>
+          </a:ln>
+        </p:spPr>
+        <p:style>
+          <a:lnRef idx="2">
+            <a:schemeClr val="accent1">
+              <a:shade val="15000"/>
+            </a:schemeClr>
+          </a:lnRef>
+          <a:fillRef idx="1">
+            <a:schemeClr val="accent1"/>
+          </a:fillRef>
+          <a:effectRef idx="0">
+            <a:schemeClr val="accent1"/>
+          </a:effectRef>
+          <a:fontRef idx="minor">
+            <a:schemeClr val="lt1"/>
+          </a:fontRef>
+        </p:style>
+        <p:txBody>
+          <a:bodyPr rtlCol="0" anchor="ctr"/>
+          <a:lstStyle/>
+          <a:p>
+            <a:pPr algn="ctr"/>
+            <a:endParaRPr lang="en-US"/>
+          </a:p>
+        </p:txBody>
+      </p:sp>
+      <p:sp>
+        <p:nvSpPr>
+          <p:cNvPr id="58" name="Rectangle 57">
+            <a:extLst>
+              <a:ext uri="{FF2B5EF4-FFF2-40B4-BE49-F238E27FC236}">
+                <a16:creationId xmlns:a16="http://schemas.microsoft.com/office/drawing/2014/main" id="{6352405E-3FBF-BD35-2A53-7D4D4F769F10}"/>
+              </a:ext>
+            </a:extLst>
+          </p:cNvPr>
+          <p:cNvSpPr/>
+          <p:nvPr/>
+        </p:nvSpPr>
+        <p:spPr>
+          <a:xfrm>
+            <a:off x="1969344" y="2896792"/>
+            <a:ext cx="45719" cy="45719"/>
+          </a:xfrm>
+          <a:prstGeom prst="rect">
+            <a:avLst/>
+          </a:prstGeom>
+          <a:ln>
+            <a:noFill/>
+          </a:ln>
+        </p:spPr>
+        <p:style>
+          <a:lnRef idx="2">
+            <a:schemeClr val="accent1">
+              <a:shade val="15000"/>
+            </a:schemeClr>
+          </a:lnRef>
+          <a:fillRef idx="1">
+            <a:schemeClr val="accent1"/>
+          </a:fillRef>
+          <a:effectRef idx="0">
+            <a:schemeClr val="accent1"/>
+          </a:effectRef>
+          <a:fontRef idx="minor">
+            <a:schemeClr val="lt1"/>
+          </a:fontRef>
+        </p:style>
+        <p:txBody>
+          <a:bodyPr rtlCol="0" anchor="ctr"/>
+          <a:lstStyle/>
+          <a:p>
+            <a:pPr algn="ctr"/>
+            <a:endParaRPr lang="en-US"/>
+          </a:p>
+        </p:txBody>
+      </p:sp>
+      <p:pic>
+        <p:nvPicPr>
+          <p:cNvPr id="4" name="Picture 2" descr="Azure Container Apps - Pricing | Microsoft Azure">
+            <a:extLst>
+              <a:ext uri="{FF2B5EF4-FFF2-40B4-BE49-F238E27FC236}">
+                <a16:creationId xmlns:a16="http://schemas.microsoft.com/office/drawing/2014/main" id="{0A118580-7827-C2CD-B30D-894E5CB01FDB}"/>
+              </a:ext>
+            </a:extLst>
+          </p:cNvPr>
+          <p:cNvPicPr>
+            <a:picLocks noChangeAspect="1" noChangeArrowheads="1"/>
+          </p:cNvPicPr>
+          <p:nvPr/>
+        </p:nvPicPr>
+        <p:blipFill>
+          <a:blip r:embed="rId13">
+            <a:extLst>
+              <a:ext uri="{28A0092B-C50C-407E-A947-70E740481C1C}">
+                <a14:useLocalDpi xmlns:a14="http://schemas.microsoft.com/office/drawing/2010/main" val="0"/>
+              </a:ext>
+            </a:extLst>
+          </a:blip>
+          <a:srcRect/>
+          <a:stretch>
+            <a:fillRect/>
+          </a:stretch>
+        </p:blipFill>
+        <p:spPr bwMode="auto">
+          <a:xfrm>
+            <a:off x="3854180" y="2743484"/>
+            <a:ext cx="1231106" cy="646331"/>
+          </a:xfrm>
+          <a:prstGeom prst="rect">
+            <a:avLst/>
+          </a:prstGeom>
+          <a:noFill/>
+          <a:extLst>
+            <a:ext uri="{909E8E84-426E-40DD-AFC4-6F175D3DCCD1}">
+              <a14:hiddenFill xmlns:a14="http://schemas.microsoft.com/office/drawing/2010/main">
+                <a:solidFill>
+                  <a:srgbClr val="FFFFFF"/>
+                </a:solidFill>
+              </a14:hiddenFill>
+            </a:ext>
+          </a:extLst>
+        </p:spPr>
+      </p:pic>
+      <p:cxnSp>
+        <p:nvCxnSpPr>
+          <p:cNvPr id="5" name="Straight Arrow Connector 4">
+            <a:extLst>
+              <a:ext uri="{FF2B5EF4-FFF2-40B4-BE49-F238E27FC236}">
+                <a16:creationId xmlns:a16="http://schemas.microsoft.com/office/drawing/2014/main" id="{F3F2472A-2DDE-08CA-5311-87C5657F39BC}"/>
+              </a:ext>
+            </a:extLst>
+          </p:cNvPr>
+          <p:cNvCxnSpPr>
+            <a:cxnSpLocks/>
+            <a:stCxn id="1028" idx="3"/>
+            <a:endCxn id="36" idx="1"/>
+          </p:cNvCxnSpPr>
+          <p:nvPr/>
+        </p:nvCxnSpPr>
+        <p:spPr>
+          <a:xfrm>
+            <a:off x="1206618" y="2544139"/>
+            <a:ext cx="825172" cy="0"/>
           </a:xfrm>
           <a:prstGeom prst="straightConnector1">
             <a:avLst/>
@@ -5286,25 +5341,30 @@
       </p:cxnSp>
       <p:cxnSp>
         <p:nvCxnSpPr>
-          <p:cNvPr id="32" name="Straight Arrow Connector 31">
-            <a:extLst>
-              <a:ext uri="{FF2B5EF4-FFF2-40B4-BE49-F238E27FC236}">
-                <a16:creationId xmlns:a16="http://schemas.microsoft.com/office/drawing/2014/main" id="{9F333533-1132-34C1-E35C-64B656DFDF45}"/>
+          <p:cNvPr id="1031" name="Straight Arrow Connector 1030">
+            <a:extLst>
+              <a:ext uri="{FF2B5EF4-FFF2-40B4-BE49-F238E27FC236}">
+                <a16:creationId xmlns:a16="http://schemas.microsoft.com/office/drawing/2014/main" id="{60DF7740-DDB6-B1A9-0BE9-8AC8DFA8613E}"/>
               </a:ext>
             </a:extLst>
           </p:cNvPr>
           <p:cNvCxnSpPr>
             <a:cxnSpLocks/>
+            <a:stCxn id="58" idx="1"/>
+            <a:endCxn id="1028" idx="2"/>
           </p:cNvCxnSpPr>
           <p:nvPr/>
         </p:nvCxnSpPr>
         <p:spPr>
-          <a:xfrm>
-            <a:off x="9456539" y="3201217"/>
-            <a:ext cx="579035" cy="487640"/>
-          </a:xfrm>
-          <a:prstGeom prst="straightConnector1">
-            <a:avLst/>
+          <a:xfrm rot="10800000" flipV="1">
+            <a:off x="653654" y="2919652"/>
+            <a:ext cx="1315691" cy="105326"/>
+          </a:xfrm>
+          <a:prstGeom prst="bentConnector4">
+            <a:avLst>
+              <a:gd name="adj1" fmla="val 28986"/>
+              <a:gd name="adj2" fmla="val 317040"/>
+            </a:avLst>
           </a:prstGeom>
           <a:ln>
             <a:tailEnd type="triangle"/>
@@ -5327,11 +5387,10 @@
       </p:cxnSp>
       <p:sp>
         <p:nvSpPr>
-          <p:cNvPr id="44" name="TextBox 43">
-            <a:hlinkClick r:id="rId14"/>
-            <a:extLst>
-              <a:ext uri="{FF2B5EF4-FFF2-40B4-BE49-F238E27FC236}">
-                <a16:creationId xmlns:a16="http://schemas.microsoft.com/office/drawing/2014/main" id="{0BC872F0-F971-18C4-9CDF-7C7DC799D211}"/>
+          <p:cNvPr id="1043" name="TextBox 1042">
+            <a:extLst>
+              <a:ext uri="{FF2B5EF4-FFF2-40B4-BE49-F238E27FC236}">
+                <a16:creationId xmlns:a16="http://schemas.microsoft.com/office/drawing/2014/main" id="{EA09D660-ECB8-CB63-632B-8B4F52DCC08D}"/>
               </a:ext>
             </a:extLst>
           </p:cNvPr>
@@ -5340,8 +5399,8 @@
         </p:nvSpPr>
         <p:spPr>
           <a:xfrm>
-            <a:off x="892803" y="6114989"/>
-            <a:ext cx="6097904" cy="246221"/>
+            <a:off x="307156" y="4673038"/>
+            <a:ext cx="1680820" cy="923330"/>
           </a:xfrm>
           <a:prstGeom prst="rect">
             <a:avLst/>
@@ -5349,23 +5408,279 @@
           <a:noFill/>
         </p:spPr>
         <p:txBody>
-          <a:bodyPr wrap="square">
+          <a:bodyPr wrap="square" rtlCol="0">
             <a:spAutoFit/>
           </a:bodyPr>
           <a:lstStyle/>
           <a:p>
-            <a:r>
-              <a:rPr lang="en-US" sz="1000" dirty="0"/>
-              <a:t>https://</a:t>
-            </a:r>
-            <a:r>
-              <a:rPr lang="en-US" sz="1000" dirty="0" err="1"/>
-              <a:t>github.com</a:t>
-            </a:r>
-            <a:r>
-              <a:rPr lang="en-US" sz="1000" dirty="0"/>
-              <a:t>/DmitriyAlergant-T1A/BetterChatGPT-t1a</a:t>
-            </a:r>
+            <a:pPr algn="ctr"/>
+            <a:r>
+              <a:rPr lang="en-US" b="1" dirty="0"/>
+              <a:t>Azure Container Registry</a:t>
+            </a:r>
+          </a:p>
+        </p:txBody>
+      </p:sp>
+      <p:sp>
+        <p:nvSpPr>
+          <p:cNvPr id="1047" name="Rectangle 1046">
+            <a:extLst>
+              <a:ext uri="{FF2B5EF4-FFF2-40B4-BE49-F238E27FC236}">
+                <a16:creationId xmlns:a16="http://schemas.microsoft.com/office/drawing/2014/main" id="{4D287C36-43E6-0B7C-FC8A-B9FF20F43692}"/>
+              </a:ext>
+            </a:extLst>
+          </p:cNvPr>
+          <p:cNvSpPr/>
+          <p:nvPr/>
+        </p:nvSpPr>
+        <p:spPr>
+          <a:xfrm>
+            <a:off x="1990211" y="3318023"/>
+            <a:ext cx="45719" cy="45719"/>
+          </a:xfrm>
+          <a:prstGeom prst="rect">
+            <a:avLst/>
+          </a:prstGeom>
+          <a:noFill/>
+          <a:ln>
+            <a:noFill/>
+          </a:ln>
+        </p:spPr>
+        <p:style>
+          <a:lnRef idx="2">
+            <a:schemeClr val="accent1">
+              <a:shade val="15000"/>
+            </a:schemeClr>
+          </a:lnRef>
+          <a:fillRef idx="1">
+            <a:schemeClr val="accent1"/>
+          </a:fillRef>
+          <a:effectRef idx="0">
+            <a:schemeClr val="accent1"/>
+          </a:effectRef>
+          <a:fontRef idx="minor">
+            <a:schemeClr val="lt1"/>
+          </a:fontRef>
+        </p:style>
+        <p:txBody>
+          <a:bodyPr rtlCol="0" anchor="ctr"/>
+          <a:lstStyle/>
+          <a:p>
+            <a:pPr algn="ctr"/>
+            <a:endParaRPr lang="en-US"/>
+          </a:p>
+        </p:txBody>
+      </p:sp>
+      <p:sp>
+        <p:nvSpPr>
+          <p:cNvPr id="1049" name="Rectangle 1048">
+            <a:extLst>
+              <a:ext uri="{FF2B5EF4-FFF2-40B4-BE49-F238E27FC236}">
+                <a16:creationId xmlns:a16="http://schemas.microsoft.com/office/drawing/2014/main" id="{3CF02F28-AF0D-012B-5E40-0D439811CC76}"/>
+              </a:ext>
+            </a:extLst>
+          </p:cNvPr>
+          <p:cNvSpPr/>
+          <p:nvPr/>
+        </p:nvSpPr>
+        <p:spPr>
+          <a:xfrm>
+            <a:off x="4541407" y="3304665"/>
+            <a:ext cx="45719" cy="45719"/>
+          </a:xfrm>
+          <a:prstGeom prst="rect">
+            <a:avLst/>
+          </a:prstGeom>
+          <a:noFill/>
+          <a:ln>
+            <a:noFill/>
+          </a:ln>
+        </p:spPr>
+        <p:style>
+          <a:lnRef idx="2">
+            <a:schemeClr val="accent1">
+              <a:shade val="15000"/>
+            </a:schemeClr>
+          </a:lnRef>
+          <a:fillRef idx="1">
+            <a:schemeClr val="accent1"/>
+          </a:fillRef>
+          <a:effectRef idx="0">
+            <a:schemeClr val="accent1"/>
+          </a:effectRef>
+          <a:fontRef idx="minor">
+            <a:schemeClr val="lt1"/>
+          </a:fontRef>
+        </p:style>
+        <p:txBody>
+          <a:bodyPr rtlCol="0" anchor="ctr"/>
+          <a:lstStyle/>
+          <a:p>
+            <a:pPr algn="ctr"/>
+            <a:endParaRPr lang="en-US"/>
+          </a:p>
+        </p:txBody>
+      </p:sp>
+      <p:sp>
+        <p:nvSpPr>
+          <p:cNvPr id="1058" name="TextBox 1057">
+            <a:extLst>
+              <a:ext uri="{FF2B5EF4-FFF2-40B4-BE49-F238E27FC236}">
+                <a16:creationId xmlns:a16="http://schemas.microsoft.com/office/drawing/2014/main" id="{044659B0-B8E0-7C5E-0B99-1F0C7B0C711A}"/>
+              </a:ext>
+            </a:extLst>
+          </p:cNvPr>
+          <p:cNvSpPr txBox="1"/>
+          <p:nvPr/>
+        </p:nvSpPr>
+        <p:spPr>
+          <a:xfrm>
+            <a:off x="1198343" y="2212064"/>
+            <a:ext cx="857522" cy="369332"/>
+          </a:xfrm>
+          <a:prstGeom prst="rect">
+            <a:avLst/>
+          </a:prstGeom>
+          <a:noFill/>
+        </p:spPr>
+        <p:txBody>
+          <a:bodyPr wrap="square" rtlCol="0">
+            <a:spAutoFit/>
+          </a:bodyPr>
+          <a:lstStyle/>
+          <a:p>
+            <a:r>
+              <a:rPr lang="en-US" dirty="0"/>
+              <a:t>/</a:t>
+            </a:r>
+            <a:r>
+              <a:rPr lang="en-US" dirty="0" err="1"/>
+              <a:t>api</a:t>
+            </a:r>
+            <a:endParaRPr lang="en-US" dirty="0"/>
+          </a:p>
+        </p:txBody>
+      </p:sp>
+      <p:sp>
+        <p:nvSpPr>
+          <p:cNvPr id="1059" name="TextBox 1058">
+            <a:extLst>
+              <a:ext uri="{FF2B5EF4-FFF2-40B4-BE49-F238E27FC236}">
+                <a16:creationId xmlns:a16="http://schemas.microsoft.com/office/drawing/2014/main" id="{F5AC4BD5-4C2E-E62C-33D2-CC4B730B0AC1}"/>
+              </a:ext>
+            </a:extLst>
+          </p:cNvPr>
+          <p:cNvSpPr txBox="1"/>
+          <p:nvPr/>
+        </p:nvSpPr>
+        <p:spPr>
+          <a:xfrm>
+            <a:off x="307156" y="3215879"/>
+            <a:ext cx="2211485" cy="307777"/>
+          </a:xfrm>
+          <a:prstGeom prst="rect">
+            <a:avLst/>
+          </a:prstGeom>
+          <a:noFill/>
+        </p:spPr>
+        <p:txBody>
+          <a:bodyPr wrap="square" rtlCol="0">
+            <a:spAutoFit/>
+          </a:bodyPr>
+          <a:lstStyle/>
+          <a:p>
+            <a:r>
+              <a:rPr lang="en-US" sz="1400" dirty="0"/>
+              <a:t>static app serving</a:t>
+            </a:r>
+          </a:p>
+        </p:txBody>
+      </p:sp>
+      <p:sp>
+        <p:nvSpPr>
+          <p:cNvPr id="1060" name="TextBox 1059">
+            <a:extLst>
+              <a:ext uri="{FF2B5EF4-FFF2-40B4-BE49-F238E27FC236}">
+                <a16:creationId xmlns:a16="http://schemas.microsoft.com/office/drawing/2014/main" id="{8E1306DB-C9FD-EA4C-E4FE-E1FDC62D356C}"/>
+              </a:ext>
+            </a:extLst>
+          </p:cNvPr>
+          <p:cNvSpPr txBox="1"/>
+          <p:nvPr/>
+        </p:nvSpPr>
+        <p:spPr>
+          <a:xfrm>
+            <a:off x="5562623" y="2322746"/>
+            <a:ext cx="2136025" cy="276999"/>
+          </a:xfrm>
+          <a:prstGeom prst="rect">
+            <a:avLst/>
+          </a:prstGeom>
+          <a:noFill/>
+        </p:spPr>
+        <p:txBody>
+          <a:bodyPr wrap="square" rtlCol="0">
+            <a:spAutoFit/>
+          </a:bodyPr>
+          <a:lstStyle/>
+          <a:p>
+            <a:pPr algn="ctr"/>
+            <a:r>
+              <a:rPr lang="en-US" sz="1200"/>
+              <a:t>Messages API</a:t>
+            </a:r>
+            <a:endParaRPr lang="en-US" sz="1200" dirty="0"/>
+          </a:p>
+        </p:txBody>
+      </p:sp>
+      <p:sp>
+        <p:nvSpPr>
+          <p:cNvPr id="1062" name="Rectangle 1061">
+            <a:extLst>
+              <a:ext uri="{FF2B5EF4-FFF2-40B4-BE49-F238E27FC236}">
+                <a16:creationId xmlns:a16="http://schemas.microsoft.com/office/drawing/2014/main" id="{11E45E97-BCB9-5801-77D7-CA7BEDD53453}"/>
+              </a:ext>
+            </a:extLst>
+          </p:cNvPr>
+          <p:cNvSpPr/>
+          <p:nvPr/>
+        </p:nvSpPr>
+        <p:spPr>
+          <a:xfrm>
+            <a:off x="5055306" y="4588122"/>
+            <a:ext cx="45719" cy="54936"/>
+          </a:xfrm>
+          <a:prstGeom prst="rect">
+            <a:avLst/>
+          </a:prstGeom>
+          <a:ln>
+            <a:solidFill>
+              <a:schemeClr val="bg1"/>
+            </a:solidFill>
+          </a:ln>
+        </p:spPr>
+        <p:style>
+          <a:lnRef idx="2">
+            <a:schemeClr val="accent1">
+              <a:shade val="15000"/>
+            </a:schemeClr>
+          </a:lnRef>
+          <a:fillRef idx="1">
+            <a:schemeClr val="accent1"/>
+          </a:fillRef>
+          <a:effectRef idx="0">
+            <a:schemeClr val="accent1"/>
+          </a:effectRef>
+          <a:fontRef idx="minor">
+            <a:schemeClr val="lt1"/>
+          </a:fontRef>
+        </p:style>
+        <p:txBody>
+          <a:bodyPr rtlCol="0" anchor="ctr"/>
+          <a:lstStyle/>
+          <a:p>
+            <a:pPr algn="ctr"/>
+            <a:endParaRPr lang="en-US"/>
           </a:p>
         </p:txBody>
       </p:sp>

</xml_diff>